<commit_message>
Adding age to power point
</commit_message>
<xml_diff>
--- a/cse135schema.pptx
+++ b/cse135schema.pptx
@@ -288,7 +288,7 @@
           <a:p>
             <a:fld id="{EE0C2178-2E82-D643-9F71-942F8020EBB4}" type="datetimeFigureOut">
               <a:rPr lang="en-US" smtClean="0"/>
-              <a:t>4/22/14</a:t>
+              <a:t>4/28/14</a:t>
             </a:fld>
             <a:endParaRPr lang="en-US"/>
           </a:p>
@@ -458,7 +458,7 @@
           <a:p>
             <a:fld id="{EE0C2178-2E82-D643-9F71-942F8020EBB4}" type="datetimeFigureOut">
               <a:rPr lang="en-US" smtClean="0"/>
-              <a:t>4/22/14</a:t>
+              <a:t>4/28/14</a:t>
             </a:fld>
             <a:endParaRPr lang="en-US"/>
           </a:p>
@@ -638,7 +638,7 @@
           <a:p>
             <a:fld id="{EE0C2178-2E82-D643-9F71-942F8020EBB4}" type="datetimeFigureOut">
               <a:rPr lang="en-US" smtClean="0"/>
-              <a:t>4/22/14</a:t>
+              <a:t>4/28/14</a:t>
             </a:fld>
             <a:endParaRPr lang="en-US"/>
           </a:p>
@@ -808,7 +808,7 @@
           <a:p>
             <a:fld id="{EE0C2178-2E82-D643-9F71-942F8020EBB4}" type="datetimeFigureOut">
               <a:rPr lang="en-US" smtClean="0"/>
-              <a:t>4/22/14</a:t>
+              <a:t>4/28/14</a:t>
             </a:fld>
             <a:endParaRPr lang="en-US"/>
           </a:p>
@@ -1054,7 +1054,7 @@
           <a:p>
             <a:fld id="{EE0C2178-2E82-D643-9F71-942F8020EBB4}" type="datetimeFigureOut">
               <a:rPr lang="en-US" smtClean="0"/>
-              <a:t>4/22/14</a:t>
+              <a:t>4/28/14</a:t>
             </a:fld>
             <a:endParaRPr lang="en-US"/>
           </a:p>
@@ -1342,7 +1342,7 @@
           <a:p>
             <a:fld id="{EE0C2178-2E82-D643-9F71-942F8020EBB4}" type="datetimeFigureOut">
               <a:rPr lang="en-US" smtClean="0"/>
-              <a:t>4/22/14</a:t>
+              <a:t>4/28/14</a:t>
             </a:fld>
             <a:endParaRPr lang="en-US"/>
           </a:p>
@@ -1764,7 +1764,7 @@
           <a:p>
             <a:fld id="{EE0C2178-2E82-D643-9F71-942F8020EBB4}" type="datetimeFigureOut">
               <a:rPr lang="en-US" smtClean="0"/>
-              <a:t>4/22/14</a:t>
+              <a:t>4/28/14</a:t>
             </a:fld>
             <a:endParaRPr lang="en-US"/>
           </a:p>
@@ -1882,7 +1882,7 @@
           <a:p>
             <a:fld id="{EE0C2178-2E82-D643-9F71-942F8020EBB4}" type="datetimeFigureOut">
               <a:rPr lang="en-US" smtClean="0"/>
-              <a:t>4/22/14</a:t>
+              <a:t>4/28/14</a:t>
             </a:fld>
             <a:endParaRPr lang="en-US"/>
           </a:p>
@@ -1977,7 +1977,7 @@
           <a:p>
             <a:fld id="{EE0C2178-2E82-D643-9F71-942F8020EBB4}" type="datetimeFigureOut">
               <a:rPr lang="en-US" smtClean="0"/>
-              <a:t>4/22/14</a:t>
+              <a:t>4/28/14</a:t>
             </a:fld>
             <a:endParaRPr lang="en-US"/>
           </a:p>
@@ -2254,7 +2254,7 @@
           <a:p>
             <a:fld id="{EE0C2178-2E82-D643-9F71-942F8020EBB4}" type="datetimeFigureOut">
               <a:rPr lang="en-US" smtClean="0"/>
-              <a:t>4/22/14</a:t>
+              <a:t>4/28/14</a:t>
             </a:fld>
             <a:endParaRPr lang="en-US"/>
           </a:p>
@@ -2507,7 +2507,7 @@
           <a:p>
             <a:fld id="{EE0C2178-2E82-D643-9F71-942F8020EBB4}" type="datetimeFigureOut">
               <a:rPr lang="en-US" smtClean="0"/>
-              <a:t>4/22/14</a:t>
+              <a:t>4/28/14</a:t>
             </a:fld>
             <a:endParaRPr lang="en-US"/>
           </a:p>
@@ -2720,7 +2720,7 @@
           <a:p>
             <a:fld id="{EE0C2178-2E82-D643-9F71-942F8020EBB4}" type="datetimeFigureOut">
               <a:rPr lang="en-US" smtClean="0"/>
-              <a:t>4/22/14</a:t>
+              <a:t>4/28/14</a:t>
             </a:fld>
             <a:endParaRPr lang="en-US"/>
           </a:p>
@@ -3667,7 +3667,7 @@
         </p:nvSpPr>
         <p:spPr>
           <a:xfrm>
-            <a:off x="1764244" y="1704377"/>
+            <a:off x="2005158" y="2389716"/>
             <a:ext cx="987424" cy="465667"/>
           </a:xfrm>
           <a:prstGeom prst="ellipse">
@@ -4384,7 +4384,7 @@
         <p:spPr>
           <a:xfrm flipH="1" flipV="1">
             <a:off x="1296458" y="1375832"/>
-            <a:ext cx="612391" cy="396740"/>
+            <a:ext cx="853305" cy="1082079"/>
           </a:xfrm>
           <a:prstGeom prst="line">
             <a:avLst/>
@@ -5199,6 +5199,92 @@
           </a:p>
         </p:txBody>
       </p:sp>
+      <p:sp>
+        <p:nvSpPr>
+          <p:cNvPr id="52" name="Oval 51"/>
+          <p:cNvSpPr/>
+          <p:nvPr/>
+        </p:nvSpPr>
+        <p:spPr>
+          <a:xfrm>
+            <a:off x="2645303" y="1704377"/>
+            <a:ext cx="987424" cy="465667"/>
+          </a:xfrm>
+          <a:prstGeom prst="ellipse">
+            <a:avLst/>
+          </a:prstGeom>
+        </p:spPr>
+        <p:style>
+          <a:lnRef idx="1">
+            <a:schemeClr val="accent3"/>
+          </a:lnRef>
+          <a:fillRef idx="3">
+            <a:schemeClr val="accent3"/>
+          </a:fillRef>
+          <a:effectRef idx="2">
+            <a:schemeClr val="accent3"/>
+          </a:effectRef>
+          <a:fontRef idx="minor">
+            <a:schemeClr val="lt1"/>
+          </a:fontRef>
+        </p:style>
+        <p:txBody>
+          <a:bodyPr rtlCol="0" anchor="ctr"/>
+          <a:lstStyle/>
+          <a:p>
+            <a:pPr algn="ctr"/>
+            <a:r>
+              <a:rPr lang="en-US" dirty="0">
+                <a:solidFill>
+                  <a:srgbClr val="000000"/>
+                </a:solidFill>
+              </a:rPr>
+              <a:t>a</a:t>
+            </a:r>
+            <a:r>
+              <a:rPr lang="en-US" dirty="0" smtClean="0">
+                <a:solidFill>
+                  <a:srgbClr val="000000"/>
+                </a:solidFill>
+              </a:rPr>
+              <a:t>ge</a:t>
+            </a:r>
+          </a:p>
+        </p:txBody>
+      </p:sp>
+      <p:cxnSp>
+        <p:nvCxnSpPr>
+          <p:cNvPr id="54" name="Straight Connector 53"/>
+          <p:cNvCxnSpPr>
+            <a:stCxn id="52" idx="1"/>
+            <a:endCxn id="2" idx="2"/>
+          </p:cNvCxnSpPr>
+          <p:nvPr/>
+        </p:nvCxnSpPr>
+        <p:spPr>
+          <a:xfrm flipH="1" flipV="1">
+            <a:off x="1296458" y="1375832"/>
+            <a:ext cx="1493450" cy="396740"/>
+          </a:xfrm>
+          <a:prstGeom prst="line">
+            <a:avLst/>
+          </a:prstGeom>
+        </p:spPr>
+        <p:style>
+          <a:lnRef idx="2">
+            <a:schemeClr val="accent1"/>
+          </a:lnRef>
+          <a:fillRef idx="0">
+            <a:schemeClr val="accent1"/>
+          </a:fillRef>
+          <a:effectRef idx="1">
+            <a:schemeClr val="accent1"/>
+          </a:effectRef>
+          <a:fontRef idx="minor">
+            <a:schemeClr val="tx1"/>
+          </a:fontRef>
+        </p:style>
+      </p:cxnSp>
     </p:spTree>
     <p:extLst>
       <p:ext uri="{BB962C8B-B14F-4D97-AF65-F5344CB8AC3E}">

</xml_diff>